<commit_message>
fix cross out slide
</commit_message>
<xml_diff>
--- a/presentation/de/Sonic PI Workshop_de-reworked.pptx
+++ b/presentation/de/Sonic PI Workshop_de-reworked.pptx
@@ -227,7 +227,7 @@
             <a:fld id="{7FD773D1-FC60-4896-8BCC-9B28FBDAB5FD}" type="datetimeFigureOut">
               <a:rPr lang="de-DE" smtClean="0"/>
               <a:pPr/>
-              <a:t>09.03.18</a:t>
+              <a:t>20.04.18</a:t>
             </a:fld>
             <a:endParaRPr lang="de-DE"/>
           </a:p>
@@ -394,7 +394,7 @@
             <a:fld id="{72145D81-8E55-40FC-9585-CFDCFEF92FEB}" type="datetimeFigureOut">
               <a:rPr lang="de-DE" smtClean="0"/>
               <a:pPr/>
-              <a:t>09.03.18</a:t>
+              <a:t>20.04.18</a:t>
             </a:fld>
             <a:endParaRPr lang="de-DE"/>
           </a:p>
@@ -3165,7 +3165,7 @@
             <a:fld id="{421FAFA7-FD27-4797-86F0-797A053F7FF1}" type="datetimeFigureOut">
               <a:rPr lang="de-DE" smtClean="0"/>
               <a:pPr/>
-              <a:t>09.03.18</a:t>
+              <a:t>20.04.18</a:t>
             </a:fld>
             <a:endParaRPr lang="de-DE"/>
           </a:p>
@@ -4700,7 +4700,7 @@
             <a:fld id="{421FAFA7-FD27-4797-86F0-797A053F7FF1}" type="datetimeFigureOut">
               <a:rPr lang="de-DE" smtClean="0"/>
               <a:pPr/>
-              <a:t>09.03.18</a:t>
+              <a:t>20.04.18</a:t>
             </a:fld>
             <a:endParaRPr lang="de-DE"/>
           </a:p>
@@ -12185,7 +12185,7 @@
         </p:nvCxnSpPr>
         <p:spPr>
           <a:xfrm flipV="1">
-            <a:off x="1552491" y="1813338"/>
+            <a:off x="1628800" y="1504051"/>
             <a:ext cx="1080120" cy="216024"/>
           </a:xfrm>
           <a:prstGeom prst="line">
@@ -12215,7 +12215,7 @@
         </p:nvCxnSpPr>
         <p:spPr>
           <a:xfrm>
-            <a:off x="1624499" y="1741330"/>
+            <a:off x="1659111" y="1504051"/>
             <a:ext cx="1080120" cy="216024"/>
           </a:xfrm>
           <a:prstGeom prst="line">

</xml_diff>